<commit_message>
group by summarize draft done
</commit_message>
<xml_diff>
--- a/images/art.pptx
+++ b/images/art.pptx
@@ -3636,7 +3636,7 @@
           <p:nvPr>
             <p:extLst>
               <p:ext uri="{D42A27DB-BD31-4B8C-83A1-F6EECF244321}">
-                <p14:modId xmlns:p14="http://schemas.microsoft.com/office/powerpoint/2010/main" val="1748052262"/>
+                <p14:modId xmlns:p14="http://schemas.microsoft.com/office/powerpoint/2010/main" val="2948650668"/>
               </p:ext>
             </p:extLst>
           </p:nvPr>
@@ -3766,7 +3766,7 @@
                   </a:txBody>
                   <a:tcPr anchor="ctr">
                     <a:solidFill>
-                      <a:srgbClr val="598890"/>
+                      <a:srgbClr val="DC8701"/>
                     </a:solidFill>
                   </a:tcPr>
                 </a:tc>
@@ -3795,7 +3795,7 @@
                   </a:txBody>
                   <a:tcPr anchor="ctr">
                     <a:solidFill>
-                      <a:srgbClr val="598890"/>
+                      <a:srgbClr val="DC8701"/>
                     </a:solidFill>
                   </a:tcPr>
                 </a:tc>
@@ -3824,7 +3824,7 @@
                   </a:txBody>
                   <a:tcPr anchor="ctr">
                     <a:solidFill>
-                      <a:srgbClr val="598890"/>
+                      <a:srgbClr val="DC8701"/>
                     </a:solidFill>
                   </a:tcPr>
                 </a:tc>
@@ -4251,7 +4251,7 @@
             <a:avLst/>
           </a:prstGeom>
           <a:solidFill>
-            <a:srgbClr val="598890"/>
+            <a:srgbClr val="DC8701"/>
           </a:solidFill>
         </p:spPr>
         <p:txBody>
@@ -4435,7 +4435,7 @@
             <a:avLst/>
           </a:prstGeom>
           <a:solidFill>
-            <a:srgbClr val="598890"/>
+            <a:srgbClr val="DC8701"/>
           </a:solidFill>
         </p:spPr>
         <p:txBody>
@@ -4784,108 +4784,6 @@
       </p:cxnSp>
       <p:sp>
         <p:nvSpPr>
-          <p:cNvPr id="32" name="TextBox 31">
-            <a:extLst>
-              <a:ext uri="{FF2B5EF4-FFF2-40B4-BE49-F238E27FC236}">
-                <a16:creationId xmlns:a16="http://schemas.microsoft.com/office/drawing/2014/main" id="{D69785F8-2366-FC91-7353-F861AA837111}"/>
-              </a:ext>
-            </a:extLst>
-          </p:cNvPr>
-          <p:cNvSpPr txBox="1"/>
-          <p:nvPr/>
-        </p:nvSpPr>
-        <p:spPr>
-          <a:xfrm>
-            <a:off x="6141526" y="789674"/>
-            <a:ext cx="3529786" cy="919401"/>
-          </a:xfrm>
-          <a:prstGeom prst="roundRect">
-            <a:avLst/>
-          </a:prstGeom>
-          <a:solidFill>
-            <a:srgbClr val="DC8701"/>
-          </a:solidFill>
-          <a:ln>
-            <a:solidFill>
-              <a:srgbClr val="DC8701"/>
-            </a:solidFill>
-          </a:ln>
-        </p:spPr>
-        <p:txBody>
-          <a:bodyPr wrap="none" rtlCol="0">
-            <a:spAutoFit/>
-          </a:bodyPr>
-          <a:lstStyle/>
-          <a:p>
-            <a:pPr algn="ctr"/>
-            <a:r>
-              <a:rPr lang="en-US" sz="2400" dirty="0">
-                <a:solidFill>
-                  <a:schemeClr val="bg1"/>
-                </a:solidFill>
-                <a:latin typeface="Corbel" panose="020B0503020204020204" pitchFamily="34" charset="0"/>
-              </a:rPr>
-              <a:t>The index range 1:4</a:t>
-            </a:r>
-          </a:p>
-          <a:p>
-            <a:pPr algn="ctr"/>
-            <a:r>
-              <a:rPr lang="en-US" sz="2400" dirty="0">
-                <a:solidFill>
-                  <a:schemeClr val="bg1"/>
-                </a:solidFill>
-                <a:latin typeface="Corbel" panose="020B0503020204020204" pitchFamily="34" charset="0"/>
-              </a:rPr>
-              <a:t>Selects 2</a:t>
-            </a:r>
-            <a:r>
-              <a:rPr lang="en-US" sz="2400" baseline="30000" dirty="0">
-                <a:solidFill>
-                  <a:schemeClr val="bg1"/>
-                </a:solidFill>
-                <a:latin typeface="Corbel" panose="020B0503020204020204" pitchFamily="34" charset="0"/>
-              </a:rPr>
-              <a:t>nd</a:t>
-            </a:r>
-            <a:r>
-              <a:rPr lang="en-US" sz="2400" dirty="0">
-                <a:solidFill>
-                  <a:schemeClr val="bg1"/>
-                </a:solidFill>
-                <a:latin typeface="Corbel" panose="020B0503020204020204" pitchFamily="34" charset="0"/>
-              </a:rPr>
-              <a:t>  to 4</a:t>
-            </a:r>
-            <a:r>
-              <a:rPr lang="en-US" sz="2400" baseline="30000" dirty="0">
-                <a:solidFill>
-                  <a:schemeClr val="bg1"/>
-                </a:solidFill>
-                <a:latin typeface="Corbel" panose="020B0503020204020204" pitchFamily="34" charset="0"/>
-              </a:rPr>
-              <a:t>th</a:t>
-            </a:r>
-            <a:r>
-              <a:rPr lang="en-US" sz="2400" dirty="0">
-                <a:solidFill>
-                  <a:schemeClr val="bg1"/>
-                </a:solidFill>
-                <a:latin typeface="Corbel" panose="020B0503020204020204" pitchFamily="34" charset="0"/>
-              </a:rPr>
-              <a:t> columns</a:t>
-            </a:r>
-            <a:endParaRPr lang="en-CH" sz="2400" dirty="0">
-              <a:solidFill>
-                <a:schemeClr val="bg1"/>
-              </a:solidFill>
-              <a:latin typeface="Corbel" panose="020B0503020204020204" pitchFamily="34" charset="0"/>
-            </a:endParaRPr>
-          </a:p>
-        </p:txBody>
-      </p:sp>
-      <p:sp>
-        <p:nvSpPr>
           <p:cNvPr id="33" name="Right Brace 32">
             <a:extLst>
               <a:ext uri="{FF2B5EF4-FFF2-40B4-BE49-F238E27FC236}">
@@ -4929,6 +4827,108 @@
               <a:solidFill>
                 <a:srgbClr val="DC8701"/>
               </a:solidFill>
+            </a:endParaRPr>
+          </a:p>
+        </p:txBody>
+      </p:sp>
+      <p:sp>
+        <p:nvSpPr>
+          <p:cNvPr id="32" name="TextBox 31">
+            <a:extLst>
+              <a:ext uri="{FF2B5EF4-FFF2-40B4-BE49-F238E27FC236}">
+                <a16:creationId xmlns:a16="http://schemas.microsoft.com/office/drawing/2014/main" id="{D69785F8-2366-FC91-7353-F861AA837111}"/>
+              </a:ext>
+            </a:extLst>
+          </p:cNvPr>
+          <p:cNvSpPr txBox="1"/>
+          <p:nvPr/>
+        </p:nvSpPr>
+        <p:spPr>
+          <a:xfrm>
+            <a:off x="5399620" y="717904"/>
+            <a:ext cx="5054709" cy="1055608"/>
+          </a:xfrm>
+          <a:prstGeom prst="roundRect">
+            <a:avLst/>
+          </a:prstGeom>
+          <a:solidFill>
+            <a:srgbClr val="DC8701"/>
+          </a:solidFill>
+          <a:ln>
+            <a:solidFill>
+              <a:srgbClr val="DC8701"/>
+            </a:solidFill>
+          </a:ln>
+        </p:spPr>
+        <p:txBody>
+          <a:bodyPr wrap="none" rtlCol="0">
+            <a:spAutoFit/>
+          </a:bodyPr>
+          <a:lstStyle/>
+          <a:p>
+            <a:pPr algn="ctr"/>
+            <a:r>
+              <a:rPr lang="en-US" sz="2800" dirty="0">
+                <a:solidFill>
+                  <a:schemeClr val="bg1"/>
+                </a:solidFill>
+                <a:latin typeface="Corbel" panose="020B0503020204020204" pitchFamily="34" charset="0"/>
+              </a:rPr>
+              <a:t>The INDEX range 1:4</a:t>
+            </a:r>
+          </a:p>
+          <a:p>
+            <a:pPr algn="ctr"/>
+            <a:r>
+              <a:rPr lang="en-US" sz="2800" dirty="0">
+                <a:solidFill>
+                  <a:schemeClr val="bg1"/>
+                </a:solidFill>
+                <a:latin typeface="Corbel" panose="020B0503020204020204" pitchFamily="34" charset="0"/>
+              </a:rPr>
+              <a:t>Selects the 2</a:t>
+            </a:r>
+            <a:r>
+              <a:rPr lang="en-US" sz="2800" baseline="30000" dirty="0">
+                <a:solidFill>
+                  <a:schemeClr val="bg1"/>
+                </a:solidFill>
+                <a:latin typeface="Corbel" panose="020B0503020204020204" pitchFamily="34" charset="0"/>
+              </a:rPr>
+              <a:t>nd</a:t>
+            </a:r>
+            <a:r>
+              <a:rPr lang="en-US" sz="2800" dirty="0">
+                <a:solidFill>
+                  <a:schemeClr val="bg1"/>
+                </a:solidFill>
+                <a:latin typeface="Corbel" panose="020B0503020204020204" pitchFamily="34" charset="0"/>
+              </a:rPr>
+              <a:t>  to 4</a:t>
+            </a:r>
+            <a:r>
+              <a:rPr lang="en-US" sz="2800" baseline="30000" dirty="0">
+                <a:solidFill>
+                  <a:schemeClr val="bg1"/>
+                </a:solidFill>
+                <a:latin typeface="Corbel" panose="020B0503020204020204" pitchFamily="34" charset="0"/>
+              </a:rPr>
+              <a:t>th</a:t>
+            </a:r>
+            <a:r>
+              <a:rPr lang="en-US" sz="2800" dirty="0">
+                <a:solidFill>
+                  <a:schemeClr val="bg1"/>
+                </a:solidFill>
+                <a:latin typeface="Corbel" panose="020B0503020204020204" pitchFamily="34" charset="0"/>
+              </a:rPr>
+              <a:t> COLUMNS</a:t>
+            </a:r>
+            <a:endParaRPr lang="en-CH" sz="2800" dirty="0">
+              <a:solidFill>
+                <a:schemeClr val="bg1"/>
+              </a:solidFill>
+              <a:latin typeface="Corbel" panose="020B0503020204020204" pitchFamily="34" charset="0"/>
             </a:endParaRPr>
           </a:p>
         </p:txBody>

</xml_diff>